<commit_message>
Fixed the misuse of the word flyweight pattern.
</commit_message>
<xml_diff>
--- a/cppnow2015_taka.pptx
+++ b/cppnow2015_taka.pptx
@@ -251,7 +251,7 @@
           <a:p>
             <a:fld id="{B721E200-EF9E-4D5F-B655-BC50791D2276}" type="datetimeFigureOut">
               <a:rPr kumimoji="1" lang="ja-JP" altLang="en-US" smtClean="0"/>
-              <a:t>2015/5/11</a:t>
+              <a:t>2015/5/12</a:t>
             </a:fld>
             <a:endParaRPr kumimoji="1" lang="ja-JP" altLang="en-US"/>
           </a:p>
@@ -416,7 +416,7 @@
           <a:p>
             <a:fld id="{FB4CFF12-3B27-4625-947C-1BCC09EEBA33}" type="datetimeFigureOut">
               <a:rPr kumimoji="1" lang="ja-JP" altLang="en-US" smtClean="0"/>
-              <a:t>2015/5/11</a:t>
+              <a:t>2015/5/12</a:t>
             </a:fld>
             <a:endParaRPr kumimoji="1" lang="ja-JP" altLang="en-US"/>
           </a:p>
@@ -977,7 +977,6 @@
               <a:rPr kumimoji="1" lang="en-US" altLang="ja-JP" baseline="0" dirty="0" smtClean="0"/>
               <a:t>::unpacked.</a:t>
             </a:r>
-            <a:endParaRPr kumimoji="1" lang="en-US" altLang="ja-JP" baseline="0" dirty="0" smtClean="0"/>
           </a:p>
           <a:p>
             <a:r>
@@ -990,23 +989,7 @@
             </a:r>
             <a:r>
               <a:rPr kumimoji="1" lang="en-US" altLang="ja-JP" baseline="0" dirty="0" smtClean="0"/>
-              <a:t> </a:t>
-            </a:r>
-            <a:r>
-              <a:rPr kumimoji="1" lang="en-US" altLang="ja-JP" baseline="0" dirty="0" smtClean="0"/>
-              <a:t>object in the buffer, </a:t>
-            </a:r>
-            <a:r>
-              <a:rPr kumimoji="1" lang="en-US" altLang="ja-JP" baseline="0" dirty="0" smtClean="0"/>
-              <a:t>the ‘next’ function returns true and sets the </a:t>
-            </a:r>
-            <a:r>
-              <a:rPr kumimoji="1" lang="en-US" altLang="ja-JP" baseline="0" dirty="0" smtClean="0"/>
-              <a:t>variable result</a:t>
-            </a:r>
-            <a:r>
-              <a:rPr kumimoji="1" lang="en-US" altLang="ja-JP" baseline="0" dirty="0" smtClean="0"/>
-              <a:t>.</a:t>
+              <a:t> object in the buffer, the ‘next’ function returns true and sets the variable result.</a:t>
             </a:r>
           </a:p>
           <a:p>
@@ -1229,7 +1212,6 @@
               <a:rPr kumimoji="1" lang="en-US" altLang="ja-JP" baseline="0" dirty="0" smtClean="0"/>
               <a:t>::unpacked.</a:t>
             </a:r>
-            <a:endParaRPr kumimoji="1" lang="en-US" altLang="ja-JP" baseline="0" dirty="0" smtClean="0"/>
           </a:p>
           <a:p>
             <a:r>
@@ -1242,15 +1224,7 @@
             </a:r>
             <a:r>
               <a:rPr kumimoji="1" lang="en-US" altLang="ja-JP" baseline="0" dirty="0" smtClean="0"/>
-              <a:t> </a:t>
-            </a:r>
-            <a:r>
-              <a:rPr kumimoji="1" lang="en-US" altLang="ja-JP" baseline="0" dirty="0" smtClean="0"/>
-              <a:t>object in the buffer, </a:t>
-            </a:r>
-            <a:r>
-              <a:rPr kumimoji="1" lang="en-US" altLang="ja-JP" baseline="0" dirty="0" smtClean="0"/>
-              <a:t>the ‘next’ function returns true and sets the result.</a:t>
+              <a:t> object in the buffer, the ‘next’ function returns true and sets the result.</a:t>
             </a:r>
           </a:p>
           <a:p>
@@ -1473,7 +1447,6 @@
               <a:rPr kumimoji="1" lang="en-US" altLang="ja-JP" baseline="0" dirty="0" smtClean="0"/>
               <a:t>::unpacked.</a:t>
             </a:r>
-            <a:endParaRPr kumimoji="1" lang="en-US" altLang="ja-JP" baseline="0" dirty="0" smtClean="0"/>
           </a:p>
           <a:p>
             <a:r>
@@ -1486,15 +1459,7 @@
             </a:r>
             <a:r>
               <a:rPr kumimoji="1" lang="en-US" altLang="ja-JP" baseline="0" dirty="0" smtClean="0"/>
-              <a:t> </a:t>
-            </a:r>
-            <a:r>
-              <a:rPr kumimoji="1" lang="en-US" altLang="ja-JP" baseline="0" dirty="0" smtClean="0"/>
-              <a:t>object in the buffer, </a:t>
-            </a:r>
-            <a:r>
-              <a:rPr kumimoji="1" lang="en-US" altLang="ja-JP" baseline="0" dirty="0" smtClean="0"/>
-              <a:t>the ‘next’ function returns true and sets the result.</a:t>
+              <a:t> object in the buffer, the ‘next’ function returns true and sets the result.</a:t>
             </a:r>
           </a:p>
           <a:p>
@@ -1717,7 +1682,6 @@
               <a:rPr kumimoji="1" lang="en-US" altLang="ja-JP" baseline="0" dirty="0" smtClean="0"/>
               <a:t>::unpacked.</a:t>
             </a:r>
-            <a:endParaRPr kumimoji="1" lang="en-US" altLang="ja-JP" baseline="0" dirty="0" smtClean="0"/>
           </a:p>
           <a:p>
             <a:r>
@@ -1730,15 +1694,7 @@
             </a:r>
             <a:r>
               <a:rPr kumimoji="1" lang="en-US" altLang="ja-JP" baseline="0" dirty="0" smtClean="0"/>
-              <a:t> </a:t>
-            </a:r>
-            <a:r>
-              <a:rPr kumimoji="1" lang="en-US" altLang="ja-JP" baseline="0" dirty="0" smtClean="0"/>
-              <a:t>object in the buffer, </a:t>
-            </a:r>
-            <a:r>
-              <a:rPr kumimoji="1" lang="en-US" altLang="ja-JP" baseline="0" dirty="0" smtClean="0"/>
-              <a:t>the ‘next’ function returns true and sets the result.</a:t>
+              <a:t> object in the buffer, the ‘next’ function returns true and sets the result.</a:t>
             </a:r>
           </a:p>
           <a:p>
@@ -1961,7 +1917,6 @@
               <a:rPr kumimoji="1" lang="en-US" altLang="ja-JP" baseline="0" dirty="0" smtClean="0"/>
               <a:t>::unpacked.</a:t>
             </a:r>
-            <a:endParaRPr kumimoji="1" lang="en-US" altLang="ja-JP" baseline="0" dirty="0" smtClean="0"/>
           </a:p>
           <a:p>
             <a:r>
@@ -1974,15 +1929,7 @@
             </a:r>
             <a:r>
               <a:rPr kumimoji="1" lang="en-US" altLang="ja-JP" baseline="0" dirty="0" smtClean="0"/>
-              <a:t> </a:t>
-            </a:r>
-            <a:r>
-              <a:rPr kumimoji="1" lang="en-US" altLang="ja-JP" baseline="0" dirty="0" smtClean="0"/>
-              <a:t>object in the buffer, </a:t>
-            </a:r>
-            <a:r>
-              <a:rPr kumimoji="1" lang="en-US" altLang="ja-JP" baseline="0" dirty="0" smtClean="0"/>
-              <a:t>the ‘next’ function returns true and sets the result.</a:t>
+              <a:t> object in the buffer, the ‘next’ function returns true and sets the result.</a:t>
             </a:r>
           </a:p>
           <a:p>
@@ -2205,7 +2152,6 @@
               <a:rPr kumimoji="1" lang="en-US" altLang="ja-JP" baseline="0" dirty="0" smtClean="0"/>
               <a:t>::unpacked.</a:t>
             </a:r>
-            <a:endParaRPr kumimoji="1" lang="en-US" altLang="ja-JP" baseline="0" dirty="0" smtClean="0"/>
           </a:p>
           <a:p>
             <a:r>
@@ -2218,15 +2164,7 @@
             </a:r>
             <a:r>
               <a:rPr kumimoji="1" lang="en-US" altLang="ja-JP" baseline="0" dirty="0" smtClean="0"/>
-              <a:t> </a:t>
-            </a:r>
-            <a:r>
-              <a:rPr kumimoji="1" lang="en-US" altLang="ja-JP" baseline="0" dirty="0" smtClean="0"/>
-              <a:t>object in the buffer, </a:t>
-            </a:r>
-            <a:r>
-              <a:rPr kumimoji="1" lang="en-US" altLang="ja-JP" baseline="0" dirty="0" smtClean="0"/>
-              <a:t>the ‘next’ function returns true and sets the result.</a:t>
+              <a:t> object in the buffer, the ‘next’ function returns true and sets the result.</a:t>
             </a:r>
           </a:p>
           <a:p>
@@ -2472,7 +2410,19 @@
           <a:p>
             <a:r>
               <a:rPr kumimoji="1" lang="en-US" altLang="ja-JP" baseline="0" dirty="0" smtClean="0"/>
-              <a:t>Those objects are implemented using flyweight pattern. The objects are allocated on the memory from flyweight factory named zone.</a:t>
+              <a:t>The sub objects </a:t>
+            </a:r>
+            <a:r>
+              <a:rPr kumimoji="1" lang="en-US" altLang="ja-JP" baseline="0" dirty="0" smtClean="0"/>
+              <a:t>are allocated on the memory </a:t>
+            </a:r>
+            <a:r>
+              <a:rPr kumimoji="1" lang="en-US" altLang="ja-JP" baseline="0" dirty="0" smtClean="0"/>
+              <a:t>pool named </a:t>
+            </a:r>
+            <a:r>
+              <a:rPr kumimoji="1" lang="en-US" altLang="ja-JP" baseline="0" dirty="0" smtClean="0"/>
+              <a:t>zone.</a:t>
             </a:r>
           </a:p>
           <a:p>
@@ -3246,11 +3196,7 @@
             </a:r>
             <a:r>
               <a:rPr kumimoji="1" lang="en-US" altLang="ja-JP" dirty="0" smtClean="0"/>
-              <a:t> header bytes</a:t>
-            </a:r>
-            <a:r>
-              <a:rPr kumimoji="1" lang="en-US" altLang="ja-JP" dirty="0" smtClean="0"/>
-              <a:t>.</a:t>
+              <a:t> header bytes.</a:t>
             </a:r>
           </a:p>
           <a:p>
@@ -3351,11 +3297,7 @@
           <a:p>
             <a:r>
               <a:rPr kumimoji="1" lang="en-US" altLang="ja-JP" dirty="0" smtClean="0"/>
-              <a:t>Let's look at the </a:t>
-            </a:r>
-            <a:r>
-              <a:rPr kumimoji="1" lang="en-US" altLang="ja-JP" dirty="0" smtClean="0"/>
-              <a:t>beginning part of</a:t>
+              <a:t>Let's look at the beginning part of</a:t>
             </a:r>
             <a:r>
               <a:rPr kumimoji="1" lang="en-US" altLang="ja-JP" baseline="0" dirty="0" smtClean="0"/>
@@ -3365,7 +3307,6 @@
               <a:rPr kumimoji="1" lang="en-US" altLang="ja-JP" dirty="0" smtClean="0"/>
               <a:t>.</a:t>
             </a:r>
-            <a:endParaRPr kumimoji="1" lang="en-US" altLang="ja-JP" dirty="0" smtClean="0"/>
           </a:p>
           <a:p>
             <a:r>
@@ -5206,7 +5147,7 @@
           <a:p>
             <a:fld id="{4FFA854E-A894-4780-A98D-160B69AA0EBB}" type="datetime1">
               <a:rPr kumimoji="1" lang="ja-JP" altLang="en-US" smtClean="0"/>
-              <a:t>2015/5/11</a:t>
+              <a:t>2015/5/12</a:t>
             </a:fld>
             <a:endParaRPr kumimoji="1" lang="ja-JP" altLang="en-US"/>
           </a:p>
@@ -5424,7 +5365,7 @@
           <a:p>
             <a:fld id="{A624E0CC-20A8-4FDA-9179-A7717AB64500}" type="datetime1">
               <a:rPr kumimoji="1" lang="ja-JP" altLang="en-US" smtClean="0"/>
-              <a:t>2015/5/11</a:t>
+              <a:t>2015/5/12</a:t>
             </a:fld>
             <a:endParaRPr kumimoji="1" lang="ja-JP" altLang="en-US"/>
           </a:p>
@@ -5642,7 +5583,7 @@
           <a:p>
             <a:fld id="{92FA0AE7-F80B-4562-9A52-48F878B3A280}" type="datetime1">
               <a:rPr kumimoji="1" lang="ja-JP" altLang="en-US" smtClean="0"/>
-              <a:t>2015/5/11</a:t>
+              <a:t>2015/5/12</a:t>
             </a:fld>
             <a:endParaRPr kumimoji="1" lang="ja-JP" altLang="en-US"/>
           </a:p>
@@ -5848,7 +5789,7 @@
           <a:p>
             <a:fld id="{20F427A6-5B7C-40F3-AE15-5052A3EBE0A6}" type="datetime1">
               <a:rPr kumimoji="1" lang="ja-JP" altLang="en-US" smtClean="0"/>
-              <a:t>2015/5/11</a:t>
+              <a:t>2015/5/12</a:t>
             </a:fld>
             <a:endParaRPr kumimoji="1" lang="ja-JP" altLang="en-US"/>
           </a:p>
@@ -6164,7 +6105,7 @@
           <a:p>
             <a:fld id="{22A189E5-AE72-475E-9E9C-1BD33792C3E6}" type="datetime1">
               <a:rPr kumimoji="1" lang="ja-JP" altLang="en-US" smtClean="0"/>
-              <a:t>2015/5/11</a:t>
+              <a:t>2015/5/12</a:t>
             </a:fld>
             <a:endParaRPr kumimoji="1" lang="ja-JP" altLang="en-US"/>
           </a:p>
@@ -6522,7 +6463,7 @@
           <a:p>
             <a:fld id="{97D7FE3B-E4B6-4BE9-B4B1-AA20BF856ACF}" type="datetime1">
               <a:rPr kumimoji="1" lang="ja-JP" altLang="en-US" smtClean="0"/>
-              <a:t>2015/5/11</a:t>
+              <a:t>2015/5/12</a:t>
             </a:fld>
             <a:endParaRPr kumimoji="1" lang="ja-JP" altLang="en-US"/>
           </a:p>
@@ -7014,7 +6955,7 @@
           <a:p>
             <a:fld id="{6A237F6B-52FB-41BE-B435-7832E53F9194}" type="datetime1">
               <a:rPr kumimoji="1" lang="ja-JP" altLang="en-US" smtClean="0"/>
-              <a:t>2015/5/11</a:t>
+              <a:t>2015/5/12</a:t>
             </a:fld>
             <a:endParaRPr kumimoji="1" lang="ja-JP" altLang="en-US"/>
           </a:p>
@@ -7138,7 +7079,7 @@
           <a:p>
             <a:fld id="{615A9D08-8FB0-4C62-9158-28FACFDE312C}" type="datetime1">
               <a:rPr kumimoji="1" lang="ja-JP" altLang="en-US" smtClean="0"/>
-              <a:t>2015/5/11</a:t>
+              <a:t>2015/5/12</a:t>
             </a:fld>
             <a:endParaRPr kumimoji="1" lang="ja-JP" altLang="en-US"/>
           </a:p>
@@ -7239,7 +7180,7 @@
           <a:p>
             <a:fld id="{1CEC9DC5-77F2-410A-944A-32C68EF68356}" type="datetime1">
               <a:rPr kumimoji="1" lang="ja-JP" altLang="en-US" smtClean="0"/>
-              <a:t>2015/5/11</a:t>
+              <a:t>2015/5/12</a:t>
             </a:fld>
             <a:endParaRPr kumimoji="1" lang="ja-JP" altLang="en-US"/>
           </a:p>
@@ -7547,7 +7488,7 @@
           <a:p>
             <a:fld id="{9DBA5B02-F5CD-4DB2-95A4-A77DC2DDE852}" type="datetime1">
               <a:rPr kumimoji="1" lang="ja-JP" altLang="en-US" smtClean="0"/>
-              <a:t>2015/5/11</a:t>
+              <a:t>2015/5/12</a:t>
             </a:fld>
             <a:endParaRPr kumimoji="1" lang="ja-JP" altLang="en-US"/>
           </a:p>
@@ -7806,7 +7747,7 @@
           <a:p>
             <a:fld id="{57D2E951-561E-4B73-8314-49F74F967523}" type="datetime1">
               <a:rPr kumimoji="1" lang="ja-JP" altLang="en-US" smtClean="0"/>
-              <a:t>2015/5/11</a:t>
+              <a:t>2015/5/12</a:t>
             </a:fld>
             <a:endParaRPr kumimoji="1" lang="ja-JP" altLang="en-US"/>
           </a:p>
@@ -8057,7 +7998,7 @@
           <a:p>
             <a:fld id="{D1585B04-2E16-41ED-9DA0-3466DC6247ED}" type="datetime1">
               <a:rPr kumimoji="1" lang="ja-JP" altLang="en-US" smtClean="0"/>
-              <a:t>2015/5/11</a:t>
+              <a:t>2015/5/12</a:t>
             </a:fld>
             <a:endParaRPr kumimoji="1" lang="ja-JP" altLang="en-US"/>
           </a:p>
@@ -8591,7 +8532,7 @@
           <a:p>
             <a:fld id="{7647159E-56E4-4C92-BAF2-FF7239B7F5EF}" type="datetime1">
               <a:rPr kumimoji="1" lang="ja-JP" altLang="en-US" smtClean="0"/>
-              <a:t>2015/5/11</a:t>
+              <a:t>2015/5/12</a:t>
             </a:fld>
             <a:endParaRPr kumimoji="1" lang="ja-JP" altLang="en-US" dirty="0"/>
           </a:p>
@@ -8737,7 +8678,7 @@
           <a:p>
             <a:fld id="{99CA62E9-2FCB-43E3-A5A3-0442C68E9D07}" type="datetime1">
               <a:rPr kumimoji="1" lang="ja-JP" altLang="en-US" smtClean="0"/>
-              <a:t>2015/5/11</a:t>
+              <a:t>2015/5/12</a:t>
             </a:fld>
             <a:endParaRPr kumimoji="1" lang="ja-JP" altLang="en-US"/>
           </a:p>
@@ -9677,7 +9618,7 @@
           <a:p>
             <a:fld id="{99CA62E9-2FCB-43E3-A5A3-0442C68E9D07}" type="datetime1">
               <a:rPr kumimoji="1" lang="ja-JP" altLang="en-US" smtClean="0"/>
-              <a:t>2015/5/11</a:t>
+              <a:t>2015/5/12</a:t>
             </a:fld>
             <a:endParaRPr kumimoji="1" lang="ja-JP" altLang="en-US"/>
           </a:p>
@@ -10677,7 +10618,7 @@
           <a:p>
             <a:fld id="{99CA62E9-2FCB-43E3-A5A3-0442C68E9D07}" type="datetime1">
               <a:rPr kumimoji="1" lang="ja-JP" altLang="en-US" smtClean="0"/>
-              <a:t>2015/5/11</a:t>
+              <a:t>2015/5/12</a:t>
             </a:fld>
             <a:endParaRPr kumimoji="1" lang="ja-JP" altLang="en-US"/>
           </a:p>
@@ -11803,7 +11744,7 @@
           <a:p>
             <a:fld id="{99CA62E9-2FCB-43E3-A5A3-0442C68E9D07}" type="datetime1">
               <a:rPr kumimoji="1" lang="ja-JP" altLang="en-US" smtClean="0"/>
-              <a:t>2015/5/11</a:t>
+              <a:t>2015/5/12</a:t>
             </a:fld>
             <a:endParaRPr kumimoji="1" lang="ja-JP" altLang="en-US"/>
           </a:p>
@@ -13018,7 +12959,7 @@
           <a:p>
             <a:fld id="{99CA62E9-2FCB-43E3-A5A3-0442C68E9D07}" type="datetime1">
               <a:rPr kumimoji="1" lang="ja-JP" altLang="en-US" smtClean="0"/>
-              <a:t>2015/5/11</a:t>
+              <a:t>2015/5/12</a:t>
             </a:fld>
             <a:endParaRPr kumimoji="1" lang="ja-JP" altLang="en-US"/>
           </a:p>
@@ -14298,7 +14239,7 @@
           <a:p>
             <a:fld id="{99CA62E9-2FCB-43E3-A5A3-0442C68E9D07}" type="datetime1">
               <a:rPr kumimoji="1" lang="ja-JP" altLang="en-US" smtClean="0"/>
-              <a:t>2015/5/11</a:t>
+              <a:t>2015/5/12</a:t>
             </a:fld>
             <a:endParaRPr kumimoji="1" lang="ja-JP" altLang="en-US"/>
           </a:p>
@@ -15554,18 +15495,7 @@
                 <a:ea typeface="ＭＳ ゴシック" panose="020B0609070205080204" pitchFamily="49" charset="-128"/>
                 <a:cs typeface="Consolas" panose="020B0609020204030204" pitchFamily="49" charset="0"/>
               </a:rPr>
-              <a:t>obj. convert </a:t>
-            </a:r>
-            <a:r>
-              <a:rPr lang="en-US" altLang="ja-JP" dirty="0" smtClean="0">
-                <a:solidFill>
-                  <a:schemeClr val="tx1"/>
-                </a:solidFill>
-                <a:latin typeface="Calibri" panose="020F0502020204030204" pitchFamily="34" charset="0"/>
-                <a:ea typeface="ＭＳ ゴシック" panose="020B0609070205080204" pitchFamily="49" charset="-128"/>
-                <a:cs typeface="Consolas" panose="020B0609020204030204" pitchFamily="49" charset="0"/>
-              </a:rPr>
-              <a:t>to C++ types</a:t>
+              <a:t>obj. convert to C++ types</a:t>
             </a:r>
             <a:endParaRPr lang="en-US" altLang="ja-JP" dirty="0">
               <a:solidFill>
@@ -15795,7 +15725,7 @@
           <a:p>
             <a:fld id="{99CA62E9-2FCB-43E3-A5A3-0442C68E9D07}" type="datetime1">
               <a:rPr kumimoji="1" lang="ja-JP" altLang="en-US" smtClean="0"/>
-              <a:t>2015/5/11</a:t>
+              <a:t>2015/5/12</a:t>
             </a:fld>
             <a:endParaRPr kumimoji="1" lang="ja-JP" altLang="en-US"/>
           </a:p>
@@ -16567,7 +16497,7 @@
           <a:p>
             <a:fld id="{99CA62E9-2FCB-43E3-A5A3-0442C68E9D07}" type="datetime1">
               <a:rPr kumimoji="1" lang="ja-JP" altLang="en-US" smtClean="0"/>
-              <a:t>2015/5/11</a:t>
+              <a:t>2015/5/12</a:t>
             </a:fld>
             <a:endParaRPr kumimoji="1" lang="ja-JP" altLang="en-US" dirty="0"/>
           </a:p>
@@ -18331,217 +18261,6 @@
       </p:sp>
       <p:sp>
         <p:nvSpPr>
-          <p:cNvPr id="46" name="角丸四角形吹き出し 45"/>
-          <p:cNvSpPr/>
-          <p:nvPr/>
-        </p:nvSpPr>
-        <p:spPr>
-          <a:xfrm>
-            <a:off x="6085576" y="4974791"/>
-            <a:ext cx="2315317" cy="484734"/>
-          </a:xfrm>
-          <a:prstGeom prst="wedgeRoundRectCallout">
-            <a:avLst>
-              <a:gd name="adj1" fmla="val -55606"/>
-              <a:gd name="adj2" fmla="val -92823"/>
-              <a:gd name="adj3" fmla="val 16667"/>
-            </a:avLst>
-          </a:prstGeom>
-          <a:ln>
-            <a:noFill/>
-          </a:ln>
-        </p:spPr>
-        <p:style>
-          <a:lnRef idx="1">
-            <a:schemeClr val="accent2"/>
-          </a:lnRef>
-          <a:fillRef idx="2">
-            <a:schemeClr val="accent2"/>
-          </a:fillRef>
-          <a:effectRef idx="1">
-            <a:schemeClr val="accent2"/>
-          </a:effectRef>
-          <a:fontRef idx="minor">
-            <a:schemeClr val="dk1"/>
-          </a:fontRef>
-        </p:style>
-        <p:txBody>
-          <a:bodyPr rtlCol="0" anchor="ctr"/>
-          <a:lstStyle/>
-          <a:p>
-            <a:pPr algn="ctr"/>
-            <a:r>
-              <a:rPr lang="en-US" altLang="ja-JP" sz="1400" dirty="0" smtClean="0">
-                <a:latin typeface="メイリオ" panose="020B0604030504040204" pitchFamily="50" charset="-128"/>
-                <a:ea typeface="メイリオ" panose="020B0604030504040204" pitchFamily="50" charset="-128"/>
-                <a:cs typeface="メイリオ" panose="020B0604030504040204" pitchFamily="50" charset="-128"/>
-              </a:rPr>
-              <a:t>Flyweights</a:t>
-            </a:r>
-          </a:p>
-        </p:txBody>
-      </p:sp>
-      <p:sp>
-        <p:nvSpPr>
-          <p:cNvPr id="47" name="角丸四角形吹き出し 46"/>
-          <p:cNvSpPr/>
-          <p:nvPr/>
-        </p:nvSpPr>
-        <p:spPr>
-          <a:xfrm>
-            <a:off x="4195543" y="6329638"/>
-            <a:ext cx="2315317" cy="484734"/>
-          </a:xfrm>
-          <a:prstGeom prst="wedgeRoundRectCallout">
-            <a:avLst>
-              <a:gd name="adj1" fmla="val -55606"/>
-              <a:gd name="adj2" fmla="val -92823"/>
-              <a:gd name="adj3" fmla="val 16667"/>
-            </a:avLst>
-          </a:prstGeom>
-          <a:ln>
-            <a:noFill/>
-          </a:ln>
-        </p:spPr>
-        <p:style>
-          <a:lnRef idx="1">
-            <a:schemeClr val="accent2"/>
-          </a:lnRef>
-          <a:fillRef idx="2">
-            <a:schemeClr val="accent2"/>
-          </a:fillRef>
-          <a:effectRef idx="1">
-            <a:schemeClr val="accent2"/>
-          </a:effectRef>
-          <a:fontRef idx="minor">
-            <a:schemeClr val="dk1"/>
-          </a:fontRef>
-        </p:style>
-        <p:txBody>
-          <a:bodyPr rtlCol="0" anchor="ctr"/>
-          <a:lstStyle/>
-          <a:p>
-            <a:pPr algn="ctr"/>
-            <a:r>
-              <a:rPr lang="en-US" altLang="ja-JP" sz="1400" dirty="0" smtClean="0">
-                <a:latin typeface="メイリオ" panose="020B0604030504040204" pitchFamily="50" charset="-128"/>
-                <a:ea typeface="メイリオ" panose="020B0604030504040204" pitchFamily="50" charset="-128"/>
-                <a:cs typeface="メイリオ" panose="020B0604030504040204" pitchFamily="50" charset="-128"/>
-              </a:rPr>
-              <a:t>Flyweight factory</a:t>
-            </a:r>
-          </a:p>
-        </p:txBody>
-      </p:sp>
-      <p:sp>
-        <p:nvSpPr>
-          <p:cNvPr id="6" name="平行四辺形 5"/>
-          <p:cNvSpPr/>
-          <p:nvPr/>
-        </p:nvSpPr>
-        <p:spPr>
-          <a:xfrm>
-            <a:off x="5734423" y="5459525"/>
-            <a:ext cx="1508811" cy="877164"/>
-          </a:xfrm>
-          <a:prstGeom prst="parallelogram">
-            <a:avLst>
-              <a:gd name="adj" fmla="val 84724"/>
-            </a:avLst>
-          </a:prstGeom>
-          <a:ln>
-            <a:noFill/>
-          </a:ln>
-        </p:spPr>
-        <p:style>
-          <a:lnRef idx="1">
-            <a:schemeClr val="accent2"/>
-          </a:lnRef>
-          <a:fillRef idx="2">
-            <a:schemeClr val="accent2"/>
-          </a:fillRef>
-          <a:effectRef idx="1">
-            <a:schemeClr val="accent2"/>
-          </a:effectRef>
-          <a:fontRef idx="minor">
-            <a:schemeClr val="dk1"/>
-          </a:fontRef>
-        </p:style>
-        <p:txBody>
-          <a:bodyPr rtlCol="0" anchor="ctr"/>
-          <a:lstStyle/>
-          <a:p>
-            <a:pPr algn="ctr"/>
-            <a:endParaRPr kumimoji="1" lang="ja-JP" altLang="en-US"/>
-          </a:p>
-        </p:txBody>
-      </p:sp>
-      <p:sp>
-        <p:nvSpPr>
-          <p:cNvPr id="90" name="角丸四角形 89"/>
-          <p:cNvSpPr/>
-          <p:nvPr/>
-        </p:nvSpPr>
-        <p:spPr>
-          <a:xfrm>
-            <a:off x="5520275" y="5655740"/>
-            <a:ext cx="2315317" cy="484734"/>
-          </a:xfrm>
-          <a:prstGeom prst="roundRect">
-            <a:avLst/>
-          </a:prstGeom>
-          <a:ln>
-            <a:noFill/>
-          </a:ln>
-        </p:spPr>
-        <p:style>
-          <a:lnRef idx="1">
-            <a:schemeClr val="accent2"/>
-          </a:lnRef>
-          <a:fillRef idx="2">
-            <a:schemeClr val="accent2"/>
-          </a:fillRef>
-          <a:effectRef idx="1">
-            <a:schemeClr val="accent2"/>
-          </a:effectRef>
-          <a:fontRef idx="minor">
-            <a:schemeClr val="dk1"/>
-          </a:fontRef>
-        </p:style>
-        <p:txBody>
-          <a:bodyPr rtlCol="0" anchor="ctr"/>
-          <a:lstStyle/>
-          <a:p>
-            <a:pPr algn="ctr"/>
-            <a:r>
-              <a:rPr lang="en-US" altLang="ja-JP" sz="1400" dirty="0" smtClean="0">
-                <a:latin typeface="メイリオ" panose="020B0604030504040204" pitchFamily="50" charset="-128"/>
-                <a:ea typeface="メイリオ" panose="020B0604030504040204" pitchFamily="50" charset="-128"/>
-                <a:cs typeface="メイリオ" panose="020B0604030504040204" pitchFamily="50" charset="-128"/>
-              </a:rPr>
-              <a:t>Flyweight</a:t>
-            </a:r>
-            <a:r>
-              <a:rPr lang="ja-JP" altLang="en-US" sz="1400" dirty="0">
-                <a:latin typeface="メイリオ" panose="020B0604030504040204" pitchFamily="50" charset="-128"/>
-                <a:ea typeface="メイリオ" panose="020B0604030504040204" pitchFamily="50" charset="-128"/>
-                <a:cs typeface="メイリオ" panose="020B0604030504040204" pitchFamily="50" charset="-128"/>
-              </a:rPr>
-              <a:t> </a:t>
-            </a:r>
-            <a:r>
-              <a:rPr lang="en-US" altLang="ja-JP" sz="1400" dirty="0" smtClean="0">
-                <a:latin typeface="メイリオ" panose="020B0604030504040204" pitchFamily="50" charset="-128"/>
-                <a:ea typeface="メイリオ" panose="020B0604030504040204" pitchFamily="50" charset="-128"/>
-                <a:cs typeface="メイリオ" panose="020B0604030504040204" pitchFamily="50" charset="-128"/>
-              </a:rPr>
-              <a:t>pattern</a:t>
-            </a:r>
-          </a:p>
-        </p:txBody>
-      </p:sp>
-      <p:sp>
-        <p:nvSpPr>
           <p:cNvPr id="91" name="角丸四角形吹き出し 90"/>
           <p:cNvSpPr/>
           <p:nvPr/>
@@ -18676,7 +18395,7 @@
           <a:p>
             <a:fld id="{99CA62E9-2FCB-43E3-A5A3-0442C68E9D07}" type="datetime1">
               <a:rPr kumimoji="1" lang="ja-JP" altLang="en-US" smtClean="0"/>
-              <a:t>2015/5/11</a:t>
+              <a:t>2015/5/12</a:t>
             </a:fld>
             <a:endParaRPr kumimoji="1" lang="ja-JP" altLang="en-US"/>
           </a:p>
@@ -20440,217 +20159,6 @@
       </p:sp>
       <p:sp>
         <p:nvSpPr>
-          <p:cNvPr id="46" name="角丸四角形吹き出し 45"/>
-          <p:cNvSpPr/>
-          <p:nvPr/>
-        </p:nvSpPr>
-        <p:spPr>
-          <a:xfrm>
-            <a:off x="6085576" y="4974791"/>
-            <a:ext cx="2315317" cy="484734"/>
-          </a:xfrm>
-          <a:prstGeom prst="wedgeRoundRectCallout">
-            <a:avLst>
-              <a:gd name="adj1" fmla="val -55606"/>
-              <a:gd name="adj2" fmla="val -92823"/>
-              <a:gd name="adj3" fmla="val 16667"/>
-            </a:avLst>
-          </a:prstGeom>
-          <a:ln>
-            <a:noFill/>
-          </a:ln>
-        </p:spPr>
-        <p:style>
-          <a:lnRef idx="1">
-            <a:schemeClr val="accent2"/>
-          </a:lnRef>
-          <a:fillRef idx="2">
-            <a:schemeClr val="accent2"/>
-          </a:fillRef>
-          <a:effectRef idx="1">
-            <a:schemeClr val="accent2"/>
-          </a:effectRef>
-          <a:fontRef idx="minor">
-            <a:schemeClr val="dk1"/>
-          </a:fontRef>
-        </p:style>
-        <p:txBody>
-          <a:bodyPr rtlCol="0" anchor="ctr"/>
-          <a:lstStyle/>
-          <a:p>
-            <a:pPr algn="ctr"/>
-            <a:r>
-              <a:rPr lang="en-US" altLang="ja-JP" sz="1400" dirty="0" smtClean="0">
-                <a:latin typeface="メイリオ" panose="020B0604030504040204" pitchFamily="50" charset="-128"/>
-                <a:ea typeface="メイリオ" panose="020B0604030504040204" pitchFamily="50" charset="-128"/>
-                <a:cs typeface="メイリオ" panose="020B0604030504040204" pitchFamily="50" charset="-128"/>
-              </a:rPr>
-              <a:t>Flyweights</a:t>
-            </a:r>
-          </a:p>
-        </p:txBody>
-      </p:sp>
-      <p:sp>
-        <p:nvSpPr>
-          <p:cNvPr id="47" name="角丸四角形吹き出し 46"/>
-          <p:cNvSpPr/>
-          <p:nvPr/>
-        </p:nvSpPr>
-        <p:spPr>
-          <a:xfrm>
-            <a:off x="4195543" y="6329638"/>
-            <a:ext cx="2315317" cy="484734"/>
-          </a:xfrm>
-          <a:prstGeom prst="wedgeRoundRectCallout">
-            <a:avLst>
-              <a:gd name="adj1" fmla="val -55606"/>
-              <a:gd name="adj2" fmla="val -92823"/>
-              <a:gd name="adj3" fmla="val 16667"/>
-            </a:avLst>
-          </a:prstGeom>
-          <a:ln>
-            <a:noFill/>
-          </a:ln>
-        </p:spPr>
-        <p:style>
-          <a:lnRef idx="1">
-            <a:schemeClr val="accent2"/>
-          </a:lnRef>
-          <a:fillRef idx="2">
-            <a:schemeClr val="accent2"/>
-          </a:fillRef>
-          <a:effectRef idx="1">
-            <a:schemeClr val="accent2"/>
-          </a:effectRef>
-          <a:fontRef idx="minor">
-            <a:schemeClr val="dk1"/>
-          </a:fontRef>
-        </p:style>
-        <p:txBody>
-          <a:bodyPr rtlCol="0" anchor="ctr"/>
-          <a:lstStyle/>
-          <a:p>
-            <a:pPr algn="ctr"/>
-            <a:r>
-              <a:rPr lang="en-US" altLang="ja-JP" sz="1400" dirty="0" smtClean="0">
-                <a:latin typeface="メイリオ" panose="020B0604030504040204" pitchFamily="50" charset="-128"/>
-                <a:ea typeface="メイリオ" panose="020B0604030504040204" pitchFamily="50" charset="-128"/>
-                <a:cs typeface="メイリオ" panose="020B0604030504040204" pitchFamily="50" charset="-128"/>
-              </a:rPr>
-              <a:t>Flyweight factory</a:t>
-            </a:r>
-          </a:p>
-        </p:txBody>
-      </p:sp>
-      <p:sp>
-        <p:nvSpPr>
-          <p:cNvPr id="6" name="平行四辺形 5"/>
-          <p:cNvSpPr/>
-          <p:nvPr/>
-        </p:nvSpPr>
-        <p:spPr>
-          <a:xfrm>
-            <a:off x="5734423" y="5459525"/>
-            <a:ext cx="1508811" cy="877164"/>
-          </a:xfrm>
-          <a:prstGeom prst="parallelogram">
-            <a:avLst>
-              <a:gd name="adj" fmla="val 84724"/>
-            </a:avLst>
-          </a:prstGeom>
-          <a:ln>
-            <a:noFill/>
-          </a:ln>
-        </p:spPr>
-        <p:style>
-          <a:lnRef idx="1">
-            <a:schemeClr val="accent2"/>
-          </a:lnRef>
-          <a:fillRef idx="2">
-            <a:schemeClr val="accent2"/>
-          </a:fillRef>
-          <a:effectRef idx="1">
-            <a:schemeClr val="accent2"/>
-          </a:effectRef>
-          <a:fontRef idx="minor">
-            <a:schemeClr val="dk1"/>
-          </a:fontRef>
-        </p:style>
-        <p:txBody>
-          <a:bodyPr rtlCol="0" anchor="ctr"/>
-          <a:lstStyle/>
-          <a:p>
-            <a:pPr algn="ctr"/>
-            <a:endParaRPr kumimoji="1" lang="ja-JP" altLang="en-US"/>
-          </a:p>
-        </p:txBody>
-      </p:sp>
-      <p:sp>
-        <p:nvSpPr>
-          <p:cNvPr id="90" name="角丸四角形 89"/>
-          <p:cNvSpPr/>
-          <p:nvPr/>
-        </p:nvSpPr>
-        <p:spPr>
-          <a:xfrm>
-            <a:off x="5520275" y="5655740"/>
-            <a:ext cx="2315317" cy="484734"/>
-          </a:xfrm>
-          <a:prstGeom prst="roundRect">
-            <a:avLst/>
-          </a:prstGeom>
-          <a:ln>
-            <a:noFill/>
-          </a:ln>
-        </p:spPr>
-        <p:style>
-          <a:lnRef idx="1">
-            <a:schemeClr val="accent2"/>
-          </a:lnRef>
-          <a:fillRef idx="2">
-            <a:schemeClr val="accent2"/>
-          </a:fillRef>
-          <a:effectRef idx="1">
-            <a:schemeClr val="accent2"/>
-          </a:effectRef>
-          <a:fontRef idx="minor">
-            <a:schemeClr val="dk1"/>
-          </a:fontRef>
-        </p:style>
-        <p:txBody>
-          <a:bodyPr rtlCol="0" anchor="ctr"/>
-          <a:lstStyle/>
-          <a:p>
-            <a:pPr algn="ctr"/>
-            <a:r>
-              <a:rPr lang="en-US" altLang="ja-JP" sz="1400" dirty="0" smtClean="0">
-                <a:latin typeface="メイリオ" panose="020B0604030504040204" pitchFamily="50" charset="-128"/>
-                <a:ea typeface="メイリオ" panose="020B0604030504040204" pitchFamily="50" charset="-128"/>
-                <a:cs typeface="メイリオ" panose="020B0604030504040204" pitchFamily="50" charset="-128"/>
-              </a:rPr>
-              <a:t>Flyweight</a:t>
-            </a:r>
-            <a:r>
-              <a:rPr lang="ja-JP" altLang="en-US" sz="1400" dirty="0">
-                <a:latin typeface="メイリオ" panose="020B0604030504040204" pitchFamily="50" charset="-128"/>
-                <a:ea typeface="メイリオ" panose="020B0604030504040204" pitchFamily="50" charset="-128"/>
-                <a:cs typeface="メイリオ" panose="020B0604030504040204" pitchFamily="50" charset="-128"/>
-              </a:rPr>
-              <a:t> </a:t>
-            </a:r>
-            <a:r>
-              <a:rPr lang="en-US" altLang="ja-JP" sz="1400" dirty="0" smtClean="0">
-                <a:latin typeface="メイリオ" panose="020B0604030504040204" pitchFamily="50" charset="-128"/>
-                <a:ea typeface="メイリオ" panose="020B0604030504040204" pitchFamily="50" charset="-128"/>
-                <a:cs typeface="メイリオ" panose="020B0604030504040204" pitchFamily="50" charset="-128"/>
-              </a:rPr>
-              <a:t>pattern</a:t>
-            </a:r>
-          </a:p>
-        </p:txBody>
-      </p:sp>
-      <p:sp>
-        <p:nvSpPr>
           <p:cNvPr id="3" name="右矢印 2"/>
           <p:cNvSpPr/>
           <p:nvPr/>
@@ -21083,7 +20591,7 @@
           <a:p>
             <a:fld id="{99CA62E9-2FCB-43E3-A5A3-0442C68E9D07}" type="datetime1">
               <a:rPr kumimoji="1" lang="ja-JP" altLang="en-US" smtClean="0"/>
-              <a:t>2015/5/11</a:t>
+              <a:t>2015/5/12</a:t>
             </a:fld>
             <a:endParaRPr kumimoji="1" lang="ja-JP" altLang="en-US"/>
           </a:p>
@@ -24432,7 +23940,7 @@
           <a:p>
             <a:fld id="{97D7FE3B-E4B6-4BE9-B4B1-AA20BF856ACF}" type="datetime1">
               <a:rPr kumimoji="1" lang="ja-JP" altLang="en-US" smtClean="0"/>
-              <a:t>2015/5/11</a:t>
+              <a:t>2015/5/12</a:t>
             </a:fld>
             <a:endParaRPr kumimoji="1" lang="ja-JP" altLang="en-US"/>
           </a:p>
@@ -24600,7 +24108,7 @@
           <a:p>
             <a:fld id="{99CA62E9-2FCB-43E3-A5A3-0442C68E9D07}" type="datetime1">
               <a:rPr kumimoji="1" lang="ja-JP" altLang="en-US" smtClean="0"/>
-              <a:t>2015/5/11</a:t>
+              <a:t>2015/5/12</a:t>
             </a:fld>
             <a:endParaRPr kumimoji="1" lang="ja-JP" altLang="en-US"/>
           </a:p>
@@ -25152,7 +24660,7 @@
           <a:p>
             <a:fld id="{97D7FE3B-E4B6-4BE9-B4B1-AA20BF856ACF}" type="datetime1">
               <a:rPr kumimoji="1" lang="ja-JP" altLang="en-US" smtClean="0"/>
-              <a:t>2015/5/11</a:t>
+              <a:t>2015/5/12</a:t>
             </a:fld>
             <a:endParaRPr kumimoji="1" lang="ja-JP" altLang="en-US"/>
           </a:p>
@@ -25309,7 +24817,7 @@
           <a:p>
             <a:fld id="{615A9D08-8FB0-4C62-9158-28FACFDE312C}" type="datetime1">
               <a:rPr kumimoji="1" lang="ja-JP" altLang="en-US" smtClean="0"/>
-              <a:t>2015/5/11</a:t>
+              <a:t>2015/5/12</a:t>
             </a:fld>
             <a:endParaRPr kumimoji="1" lang="ja-JP" altLang="en-US"/>
           </a:p>
@@ -29076,7 +28584,7 @@
           <a:p>
             <a:fld id="{20F427A6-5B7C-40F3-AE15-5052A3EBE0A6}" type="datetime1">
               <a:rPr kumimoji="1" lang="ja-JP" altLang="en-US" smtClean="0"/>
-              <a:t>2015/5/11</a:t>
+              <a:t>2015/5/12</a:t>
             </a:fld>
             <a:endParaRPr kumimoji="1" lang="ja-JP" altLang="en-US"/>
           </a:p>
@@ -34551,7 +34059,7 @@
           <a:p>
             <a:fld id="{20F427A6-5B7C-40F3-AE15-5052A3EBE0A6}" type="datetime1">
               <a:rPr kumimoji="1" lang="ja-JP" altLang="en-US" smtClean="0"/>
-              <a:t>2015/5/11</a:t>
+              <a:t>2015/5/12</a:t>
             </a:fld>
             <a:endParaRPr kumimoji="1" lang="ja-JP" altLang="en-US"/>
           </a:p>
@@ -34726,7 +34234,7 @@
           <a:p>
             <a:fld id="{20F427A6-5B7C-40F3-AE15-5052A3EBE0A6}" type="datetime1">
               <a:rPr kumimoji="1" lang="ja-JP" altLang="en-US" smtClean="0"/>
-              <a:t>2015/5/11</a:t>
+              <a:t>2015/5/12</a:t>
             </a:fld>
             <a:endParaRPr kumimoji="1" lang="ja-JP" altLang="en-US"/>
           </a:p>
@@ -34955,7 +34463,7 @@
           <a:p>
             <a:fld id="{20F427A6-5B7C-40F3-AE15-5052A3EBE0A6}" type="datetime1">
               <a:rPr kumimoji="1" lang="ja-JP" altLang="en-US" smtClean="0"/>
-              <a:t>2015/5/11</a:t>
+              <a:t>2015/5/12</a:t>
             </a:fld>
             <a:endParaRPr kumimoji="1" lang="ja-JP" altLang="en-US"/>
           </a:p>
@@ -35235,7 +34743,7 @@
           <a:p>
             <a:fld id="{6D609029-DF36-4128-90D5-F4BBB294E77D}" type="datetime1">
               <a:rPr kumimoji="1" lang="ja-JP" altLang="en-US" smtClean="0"/>
-              <a:t>2015/5/11</a:t>
+              <a:t>2015/5/12</a:t>
             </a:fld>
             <a:endParaRPr kumimoji="1" lang="ja-JP" altLang="en-US"/>
           </a:p>
@@ -35541,7 +35049,7 @@
           <a:p>
             <a:fld id="{6D609029-DF36-4128-90D5-F4BBB294E77D}" type="datetime1">
               <a:rPr kumimoji="1" lang="ja-JP" altLang="en-US" smtClean="0"/>
-              <a:t>2015/5/11</a:t>
+              <a:t>2015/5/12</a:t>
             </a:fld>
             <a:endParaRPr kumimoji="1" lang="ja-JP" altLang="en-US"/>
           </a:p>
@@ -35874,7 +35382,7 @@
           <a:p>
             <a:fld id="{97D7FE3B-E4B6-4BE9-B4B1-AA20BF856ACF}" type="datetime1">
               <a:rPr kumimoji="1" lang="ja-JP" altLang="en-US" smtClean="0"/>
-              <a:t>2015/5/11</a:t>
+              <a:t>2015/5/12</a:t>
             </a:fld>
             <a:endParaRPr kumimoji="1" lang="ja-JP" altLang="en-US"/>
           </a:p>
@@ -36129,7 +35637,7 @@
           <a:p>
             <a:fld id="{97D7FE3B-E4B6-4BE9-B4B1-AA20BF856ACF}" type="datetime1">
               <a:rPr kumimoji="1" lang="ja-JP" altLang="en-US" smtClean="0"/>
-              <a:t>2015/5/11</a:t>
+              <a:t>2015/5/12</a:t>
             </a:fld>
             <a:endParaRPr kumimoji="1" lang="ja-JP" altLang="en-US"/>
           </a:p>
@@ -37546,7 +37054,7 @@
           <a:p>
             <a:fld id="{99CA62E9-2FCB-43E3-A5A3-0442C68E9D07}" type="datetime1">
               <a:rPr kumimoji="1" lang="ja-JP" altLang="en-US" smtClean="0"/>
-              <a:t>2015/5/11</a:t>
+              <a:t>2015/5/12</a:t>
             </a:fld>
             <a:endParaRPr kumimoji="1" lang="ja-JP" altLang="en-US"/>
           </a:p>
@@ -38522,7 +38030,7 @@
           <a:p>
             <a:fld id="{CFA0AE4D-4393-4208-BE10-2A8A34378194}" type="datetime1">
               <a:rPr kumimoji="1" lang="ja-JP" altLang="en-US" smtClean="0"/>
-              <a:t>2015/5/11</a:t>
+              <a:t>2015/5/12</a:t>
             </a:fld>
             <a:endParaRPr kumimoji="1" lang="ja-JP" altLang="en-US"/>
           </a:p>
@@ -38902,7 +38410,7 @@
           <a:p>
             <a:fld id="{99CA62E9-2FCB-43E3-A5A3-0442C68E9D07}" type="datetime1">
               <a:rPr kumimoji="1" lang="ja-JP" altLang="en-US" smtClean="0"/>
-              <a:t>2015/5/11</a:t>
+              <a:t>2015/5/12</a:t>
             </a:fld>
             <a:endParaRPr kumimoji="1" lang="ja-JP" altLang="en-US"/>
           </a:p>
@@ -40172,7 +39680,7 @@
           <a:p>
             <a:fld id="{99CA62E9-2FCB-43E3-A5A3-0442C68E9D07}" type="datetime1">
               <a:rPr kumimoji="1" lang="ja-JP" altLang="en-US" smtClean="0"/>
-              <a:t>2015/5/11</a:t>
+              <a:t>2015/5/12</a:t>
             </a:fld>
             <a:endParaRPr kumimoji="1" lang="ja-JP" altLang="en-US"/>
           </a:p>

</xml_diff>